<commit_message>
drobnosti + pdf prezentace
</commit_message>
<xml_diff>
--- a/prezentace.pptx
+++ b/prezentace.pptx
@@ -5040,11 +5040,11 @@
   <p:clrMapOvr>
     <a:masterClrMapping/>
   </p:clrMapOvr>
-  <mc:AlternateContent xmlns:mc="http://schemas.openxmlformats.org/markup-compatibility/2006">
-    <mc:Choice xmlns:p14="http://schemas.microsoft.com/office/powerpoint/2010/main" Requires="p14">
+  <mc:AlternateContent xmlns:mc="http://schemas.openxmlformats.org/markup-compatibility/2006" xmlns:p14="http://schemas.microsoft.com/office/powerpoint/2010/main">
+    <mc:Choice Requires="p14">
       <p:transition spd="slow" p14:dur="2000" advTm="18375"/>
     </mc:Choice>
-    <mc:Fallback>
+    <mc:Fallback xmlns="">
       <p:transition spd="slow" advTm="18375"/>
     </mc:Fallback>
   </mc:AlternateContent>
@@ -5170,6 +5170,36 @@
           </a:p>
         </p:txBody>
       </p:sp>
+      <p:pic>
+        <p:nvPicPr>
+          <p:cNvPr id="5" name="Obrázek 4"/>
+          <p:cNvPicPr>
+            <a:picLocks noChangeAspect="1"/>
+          </p:cNvPicPr>
+          <p:nvPr/>
+        </p:nvPicPr>
+        <p:blipFill>
+          <a:blip r:embed="rId3" cstate="print">
+            <a:extLst>
+              <a:ext uri="{28A0092B-C50C-407E-A947-70E740481C1C}">
+                <a14:useLocalDpi xmlns:a14="http://schemas.microsoft.com/office/drawing/2010/main" val="0"/>
+              </a:ext>
+            </a:extLst>
+          </a:blip>
+          <a:stretch>
+            <a:fillRect/>
+          </a:stretch>
+        </p:blipFill>
+        <p:spPr>
+          <a:xfrm>
+            <a:off x="8536116" y="183511"/>
+            <a:ext cx="502676" cy="382860"/>
+          </a:xfrm>
+          <a:prstGeom prst="rect">
+            <a:avLst/>
+          </a:prstGeom>
+        </p:spPr>
+      </p:pic>
     </p:spTree>
     <p:extLst>
       <p:ext uri="{BB962C8B-B14F-4D97-AF65-F5344CB8AC3E}">
@@ -5259,6 +5289,36 @@
           </a:p>
         </p:txBody>
       </p:sp>
+      <p:pic>
+        <p:nvPicPr>
+          <p:cNvPr id="5" name="Obrázek 4"/>
+          <p:cNvPicPr>
+            <a:picLocks noChangeAspect="1"/>
+          </p:cNvPicPr>
+          <p:nvPr/>
+        </p:nvPicPr>
+        <p:blipFill>
+          <a:blip r:embed="rId3" cstate="print">
+            <a:extLst>
+              <a:ext uri="{28A0092B-C50C-407E-A947-70E740481C1C}">
+                <a14:useLocalDpi xmlns:a14="http://schemas.microsoft.com/office/drawing/2010/main" val="0"/>
+              </a:ext>
+            </a:extLst>
+          </a:blip>
+          <a:stretch>
+            <a:fillRect/>
+          </a:stretch>
+        </p:blipFill>
+        <p:spPr>
+          <a:xfrm>
+            <a:off x="8536116" y="183511"/>
+            <a:ext cx="502676" cy="382860"/>
+          </a:xfrm>
+          <a:prstGeom prst="rect">
+            <a:avLst/>
+          </a:prstGeom>
+        </p:spPr>
+      </p:pic>
     </p:spTree>
     <p:extLst>
       <p:ext uri="{BB962C8B-B14F-4D97-AF65-F5344CB8AC3E}">
@@ -6318,6 +6378,36 @@
           </a:extLst>
         </p:spPr>
       </p:pic>
+      <p:pic>
+        <p:nvPicPr>
+          <p:cNvPr id="6" name="Obrázek 5"/>
+          <p:cNvPicPr>
+            <a:picLocks noChangeAspect="1"/>
+          </p:cNvPicPr>
+          <p:nvPr/>
+        </p:nvPicPr>
+        <p:blipFill>
+          <a:blip r:embed="rId4" cstate="print">
+            <a:extLst>
+              <a:ext uri="{28A0092B-C50C-407E-A947-70E740481C1C}">
+                <a14:useLocalDpi xmlns:a14="http://schemas.microsoft.com/office/drawing/2010/main" val="0"/>
+              </a:ext>
+            </a:extLst>
+          </a:blip>
+          <a:stretch>
+            <a:fillRect/>
+          </a:stretch>
+        </p:blipFill>
+        <p:spPr>
+          <a:xfrm>
+            <a:off x="8536116" y="183511"/>
+            <a:ext cx="502676" cy="382860"/>
+          </a:xfrm>
+          <a:prstGeom prst="rect">
+            <a:avLst/>
+          </a:prstGeom>
+        </p:spPr>
+      </p:pic>
     </p:spTree>
     <p:extLst>
       <p:ext uri="{BB962C8B-B14F-4D97-AF65-F5344CB8AC3E}">
@@ -6504,6 +6594,36 @@
           </a:extLst>
         </p:spPr>
       </p:pic>
+      <p:pic>
+        <p:nvPicPr>
+          <p:cNvPr id="6" name="Obrázek 5"/>
+          <p:cNvPicPr>
+            <a:picLocks noChangeAspect="1"/>
+          </p:cNvPicPr>
+          <p:nvPr/>
+        </p:nvPicPr>
+        <p:blipFill>
+          <a:blip r:embed="rId4" cstate="print">
+            <a:extLst>
+              <a:ext uri="{28A0092B-C50C-407E-A947-70E740481C1C}">
+                <a14:useLocalDpi xmlns:a14="http://schemas.microsoft.com/office/drawing/2010/main" val="0"/>
+              </a:ext>
+            </a:extLst>
+          </a:blip>
+          <a:stretch>
+            <a:fillRect/>
+          </a:stretch>
+        </p:blipFill>
+        <p:spPr>
+          <a:xfrm>
+            <a:off x="8536116" y="183511"/>
+            <a:ext cx="502676" cy="382860"/>
+          </a:xfrm>
+          <a:prstGeom prst="rect">
+            <a:avLst/>
+          </a:prstGeom>
+        </p:spPr>
+      </p:pic>
     </p:spTree>
     <p:extLst>
       <p:ext uri="{BB962C8B-B14F-4D97-AF65-F5344CB8AC3E}">
@@ -6677,6 +6797,36 @@
               </a14:hiddenEffects>
             </a:ext>
           </a:extLst>
+        </p:spPr>
+      </p:pic>
+      <p:pic>
+        <p:nvPicPr>
+          <p:cNvPr id="6" name="Obrázek 5"/>
+          <p:cNvPicPr>
+            <a:picLocks noChangeAspect="1"/>
+          </p:cNvPicPr>
+          <p:nvPr/>
+        </p:nvPicPr>
+        <p:blipFill>
+          <a:blip r:embed="rId4" cstate="print">
+            <a:extLst>
+              <a:ext uri="{28A0092B-C50C-407E-A947-70E740481C1C}">
+                <a14:useLocalDpi xmlns:a14="http://schemas.microsoft.com/office/drawing/2010/main" val="0"/>
+              </a:ext>
+            </a:extLst>
+          </a:blip>
+          <a:stretch>
+            <a:fillRect/>
+          </a:stretch>
+        </p:blipFill>
+        <p:spPr>
+          <a:xfrm>
+            <a:off x="8536116" y="183511"/>
+            <a:ext cx="502676" cy="382860"/>
+          </a:xfrm>
+          <a:prstGeom prst="rect">
+            <a:avLst/>
+          </a:prstGeom>
         </p:spPr>
       </p:pic>
     </p:spTree>

</xml_diff>